<commit_message>
how change, i saved it before
</commit_message>
<xml_diff>
--- a/Documentation/M223_Presentation.pptx
+++ b/Documentation/M223_Presentation.pptx
@@ -15,7 +15,12 @@
     <p:sldId id="263" r:id="rId9"/>
     <p:sldId id="267" r:id="rId10"/>
     <p:sldId id="269" r:id="rId11"/>
-    <p:sldId id="262" r:id="rId12"/>
+    <p:sldId id="270" r:id="rId12"/>
+    <p:sldId id="271" r:id="rId13"/>
+    <p:sldId id="272" r:id="rId14"/>
+    <p:sldId id="273" r:id="rId15"/>
+    <p:sldId id="274" r:id="rId16"/>
+    <p:sldId id="262" r:id="rId17"/>
   </p:sldIdLst>
   <p:sldSz cx="12192000" cy="6858000"/>
   <p:notesSz cx="6858000" cy="9144000"/>
@@ -5896,10 +5901,61 @@
           <a:bodyPr/>
           <a:lstStyle/>
           <a:p>
-            <a:endParaRPr lang="en-CH"/>
-          </a:p>
-        </p:txBody>
-      </p:sp>
+            <a:r>
+              <a:rPr lang="en-US" dirty="0"/>
+              <a:t>Server Requests</a:t>
+            </a:r>
+          </a:p>
+          <a:p>
+            <a:r>
+              <a:rPr lang="en-US" dirty="0" err="1"/>
+              <a:t>Datenverarbeitung</a:t>
+            </a:r>
+            <a:r>
+              <a:rPr lang="en-US" dirty="0"/>
+              <a:t> / -</a:t>
+            </a:r>
+            <a:r>
+              <a:rPr lang="en-US" dirty="0" err="1"/>
+              <a:t>aufbereitung</a:t>
+            </a:r>
+            <a:endParaRPr lang="en-US" dirty="0"/>
+          </a:p>
+          <a:p>
+            <a:endParaRPr lang="en-CH" dirty="0"/>
+          </a:p>
+        </p:txBody>
+      </p:sp>
+      <p:pic>
+        <p:nvPicPr>
+          <p:cNvPr id="5" name="Picture 4">
+            <a:extLst>
+              <a:ext uri="{FF2B5EF4-FFF2-40B4-BE49-F238E27FC236}">
+                <a16:creationId xmlns:a16="http://schemas.microsoft.com/office/drawing/2014/main" id="{EFFCCD95-7711-D873-D84C-598A84B1CCA1}"/>
+              </a:ext>
+            </a:extLst>
+          </p:cNvPr>
+          <p:cNvPicPr>
+            <a:picLocks noChangeAspect="1"/>
+          </p:cNvPicPr>
+          <p:nvPr/>
+        </p:nvPicPr>
+        <p:blipFill>
+          <a:blip r:embed="rId2"/>
+          <a:stretch>
+            <a:fillRect/>
+          </a:stretch>
+        </p:blipFill>
+        <p:spPr>
+          <a:xfrm>
+            <a:off x="689808" y="3246246"/>
+            <a:ext cx="10812384" cy="1209844"/>
+          </a:xfrm>
+          <a:prstGeom prst="rect">
+            <a:avLst/>
+          </a:prstGeom>
+        </p:spPr>
+      </p:pic>
     </p:spTree>
     <p:extLst>
       <p:ext uri="{BB962C8B-B14F-4D97-AF65-F5344CB8AC3E}">
@@ -5914,6 +5970,1889 @@
 </file>
 
 <file path=ppt/slides/slide11.xml><?xml version="1.0" encoding="utf-8"?>
+<p:sld xmlns:a="http://schemas.openxmlformats.org/drawingml/2006/main" xmlns:r="http://schemas.openxmlformats.org/officeDocument/2006/relationships" xmlns:p="http://schemas.openxmlformats.org/presentationml/2006/main">
+  <p:cSld>
+    <p:spTree>
+      <p:nvGrpSpPr>
+        <p:cNvPr id="1" name=""/>
+        <p:cNvGrpSpPr/>
+        <p:nvPr/>
+      </p:nvGrpSpPr>
+      <p:grpSpPr>
+        <a:xfrm>
+          <a:off x="0" y="0"/>
+          <a:ext cx="0" cy="0"/>
+          <a:chOff x="0" y="0"/>
+          <a:chExt cx="0" cy="0"/>
+        </a:xfrm>
+      </p:grpSpPr>
+      <p:sp>
+        <p:nvSpPr>
+          <p:cNvPr id="2" name="Title 1">
+            <a:extLst>
+              <a:ext uri="{FF2B5EF4-FFF2-40B4-BE49-F238E27FC236}">
+                <a16:creationId xmlns:a16="http://schemas.microsoft.com/office/drawing/2014/main" id="{2090D4FF-A614-3160-C86F-37B3FEDA0417}"/>
+              </a:ext>
+            </a:extLst>
+          </p:cNvPr>
+          <p:cNvSpPr>
+            <a:spLocks noGrp="1"/>
+          </p:cNvSpPr>
+          <p:nvPr>
+            <p:ph type="title"/>
+          </p:nvPr>
+        </p:nvSpPr>
+        <p:spPr/>
+        <p:txBody>
+          <a:bodyPr/>
+          <a:lstStyle/>
+          <a:p>
+            <a:r>
+              <a:rPr lang="en-US" dirty="0"/>
+              <a:t>Interceptors</a:t>
+            </a:r>
+            <a:endParaRPr lang="en-CH" dirty="0"/>
+          </a:p>
+        </p:txBody>
+      </p:sp>
+      <p:sp>
+        <p:nvSpPr>
+          <p:cNvPr id="3" name="Content Placeholder 2">
+            <a:extLst>
+              <a:ext uri="{FF2B5EF4-FFF2-40B4-BE49-F238E27FC236}">
+                <a16:creationId xmlns:a16="http://schemas.microsoft.com/office/drawing/2014/main" id="{E0261608-CBCD-4CAE-D0DC-B198E7385766}"/>
+              </a:ext>
+            </a:extLst>
+          </p:cNvPr>
+          <p:cNvSpPr>
+            <a:spLocks noGrp="1"/>
+          </p:cNvSpPr>
+          <p:nvPr>
+            <p:ph idx="1"/>
+          </p:nvPr>
+        </p:nvSpPr>
+        <p:spPr/>
+        <p:txBody>
+          <a:bodyPr/>
+          <a:lstStyle/>
+          <a:p>
+            <a:r>
+              <a:rPr lang="en-US" dirty="0"/>
+              <a:t>In Frontend und Backend</a:t>
+            </a:r>
+          </a:p>
+          <a:p>
+            <a:r>
+              <a:rPr lang="en-US" dirty="0"/>
+              <a:t>Authorization</a:t>
+            </a:r>
+            <a:endParaRPr lang="en-CH" dirty="0"/>
+          </a:p>
+        </p:txBody>
+      </p:sp>
+      <p:pic>
+        <p:nvPicPr>
+          <p:cNvPr id="5" name="Picture 4">
+            <a:extLst>
+              <a:ext uri="{FF2B5EF4-FFF2-40B4-BE49-F238E27FC236}">
+                <a16:creationId xmlns:a16="http://schemas.microsoft.com/office/drawing/2014/main" id="{6815389C-101D-C38D-6C46-C2081ECAB18E}"/>
+              </a:ext>
+            </a:extLst>
+          </p:cNvPr>
+          <p:cNvPicPr>
+            <a:picLocks noChangeAspect="1"/>
+          </p:cNvPicPr>
+          <p:nvPr/>
+        </p:nvPicPr>
+        <p:blipFill>
+          <a:blip r:embed="rId2"/>
+          <a:stretch>
+            <a:fillRect/>
+          </a:stretch>
+        </p:blipFill>
+        <p:spPr>
+          <a:xfrm>
+            <a:off x="3854821" y="3596012"/>
+            <a:ext cx="8337179" cy="3261988"/>
+          </a:xfrm>
+          <a:prstGeom prst="rect">
+            <a:avLst/>
+          </a:prstGeom>
+        </p:spPr>
+      </p:pic>
+    </p:spTree>
+    <p:extLst>
+      <p:ext uri="{BB962C8B-B14F-4D97-AF65-F5344CB8AC3E}">
+        <p14:creationId xmlns:p14="http://schemas.microsoft.com/office/powerpoint/2010/main" val="727558458"/>
+      </p:ext>
+    </p:extLst>
+  </p:cSld>
+  <p:clrMapOvr>
+    <a:masterClrMapping/>
+  </p:clrMapOvr>
+</p:sld>
+</file>
+
+<file path=ppt/slides/slide12.xml><?xml version="1.0" encoding="utf-8"?>
+<p:sld xmlns:a="http://schemas.openxmlformats.org/drawingml/2006/main" xmlns:r="http://schemas.openxmlformats.org/officeDocument/2006/relationships" xmlns:p="http://schemas.openxmlformats.org/presentationml/2006/main">
+  <p:cSld>
+    <p:spTree>
+      <p:nvGrpSpPr>
+        <p:cNvPr id="1" name=""/>
+        <p:cNvGrpSpPr/>
+        <p:nvPr/>
+      </p:nvGrpSpPr>
+      <p:grpSpPr>
+        <a:xfrm>
+          <a:off x="0" y="0"/>
+          <a:ext cx="0" cy="0"/>
+          <a:chOff x="0" y="0"/>
+          <a:chExt cx="0" cy="0"/>
+        </a:xfrm>
+      </p:grpSpPr>
+      <p:sp>
+        <p:nvSpPr>
+          <p:cNvPr id="2" name="Title 1">
+            <a:extLst>
+              <a:ext uri="{FF2B5EF4-FFF2-40B4-BE49-F238E27FC236}">
+                <a16:creationId xmlns:a16="http://schemas.microsoft.com/office/drawing/2014/main" id="{C3D0FB7B-C71F-18AB-AB83-7D8AE6AA88BB}"/>
+              </a:ext>
+            </a:extLst>
+          </p:cNvPr>
+          <p:cNvSpPr>
+            <a:spLocks noGrp="1"/>
+          </p:cNvSpPr>
+          <p:nvPr>
+            <p:ph type="title"/>
+          </p:nvPr>
+        </p:nvSpPr>
+        <p:spPr/>
+        <p:txBody>
+          <a:bodyPr/>
+          <a:lstStyle/>
+          <a:p>
+            <a:r>
+              <a:rPr lang="en-US" dirty="0"/>
+              <a:t>Backend</a:t>
+            </a:r>
+            <a:endParaRPr lang="en-CH" dirty="0"/>
+          </a:p>
+        </p:txBody>
+      </p:sp>
+      <p:sp>
+        <p:nvSpPr>
+          <p:cNvPr id="3" name="Content Placeholder 2">
+            <a:extLst>
+              <a:ext uri="{FF2B5EF4-FFF2-40B4-BE49-F238E27FC236}">
+                <a16:creationId xmlns:a16="http://schemas.microsoft.com/office/drawing/2014/main" id="{E580572C-8C06-06A8-8E86-B8B4197ED6A4}"/>
+              </a:ext>
+            </a:extLst>
+          </p:cNvPr>
+          <p:cNvSpPr>
+            <a:spLocks noGrp="1"/>
+          </p:cNvSpPr>
+          <p:nvPr>
+            <p:ph idx="1"/>
+          </p:nvPr>
+        </p:nvSpPr>
+        <p:spPr/>
+        <p:txBody>
+          <a:bodyPr/>
+          <a:lstStyle/>
+          <a:p>
+            <a:r>
+              <a:rPr lang="en-US" dirty="0"/>
+              <a:t>Base </a:t>
+            </a:r>
+            <a:r>
+              <a:rPr lang="en-US" dirty="0" err="1"/>
+              <a:t>Api</a:t>
+            </a:r>
+            <a:endParaRPr lang="en-US" dirty="0"/>
+          </a:p>
+          <a:p>
+            <a:pPr lvl="1"/>
+            <a:r>
+              <a:rPr lang="en-US" dirty="0" err="1"/>
+              <a:t>Middlewares</a:t>
+            </a:r>
+            <a:endParaRPr lang="en-US" dirty="0"/>
+          </a:p>
+          <a:p>
+            <a:pPr lvl="1"/>
+            <a:r>
+              <a:rPr lang="en-US" dirty="0"/>
+              <a:t>Sub-APIs</a:t>
+            </a:r>
+            <a:endParaRPr lang="en-CH" dirty="0"/>
+          </a:p>
+          <a:p>
+            <a:r>
+              <a:rPr lang="en-US" dirty="0"/>
+              <a:t>API Files</a:t>
+            </a:r>
+          </a:p>
+          <a:p>
+            <a:r>
+              <a:rPr lang="en-US" dirty="0"/>
+              <a:t>Database</a:t>
+            </a:r>
+          </a:p>
+        </p:txBody>
+      </p:sp>
+    </p:spTree>
+    <p:extLst>
+      <p:ext uri="{BB962C8B-B14F-4D97-AF65-F5344CB8AC3E}">
+        <p14:creationId xmlns:p14="http://schemas.microsoft.com/office/powerpoint/2010/main" val="1849200778"/>
+      </p:ext>
+    </p:extLst>
+  </p:cSld>
+  <p:clrMapOvr>
+    <a:masterClrMapping/>
+  </p:clrMapOvr>
+</p:sld>
+</file>
+
+<file path=ppt/slides/slide13.xml><?xml version="1.0" encoding="utf-8"?>
+<p:sld xmlns:a="http://schemas.openxmlformats.org/drawingml/2006/main" xmlns:r="http://schemas.openxmlformats.org/officeDocument/2006/relationships" xmlns:p="http://schemas.openxmlformats.org/presentationml/2006/main">
+  <p:cSld>
+    <p:spTree>
+      <p:nvGrpSpPr>
+        <p:cNvPr id="1" name=""/>
+        <p:cNvGrpSpPr/>
+        <p:nvPr/>
+      </p:nvGrpSpPr>
+      <p:grpSpPr>
+        <a:xfrm>
+          <a:off x="0" y="0"/>
+          <a:ext cx="0" cy="0"/>
+          <a:chOff x="0" y="0"/>
+          <a:chExt cx="0" cy="0"/>
+        </a:xfrm>
+      </p:grpSpPr>
+      <p:sp>
+        <p:nvSpPr>
+          <p:cNvPr id="2" name="Title 1">
+            <a:extLst>
+              <a:ext uri="{FF2B5EF4-FFF2-40B4-BE49-F238E27FC236}">
+                <a16:creationId xmlns:a16="http://schemas.microsoft.com/office/drawing/2014/main" id="{C4413A9E-B4F2-91DF-B4C3-5AB7536EAA3C}"/>
+              </a:ext>
+            </a:extLst>
+          </p:cNvPr>
+          <p:cNvSpPr>
+            <a:spLocks noGrp="1"/>
+          </p:cNvSpPr>
+          <p:nvPr>
+            <p:ph type="title"/>
+          </p:nvPr>
+        </p:nvSpPr>
+        <p:spPr/>
+        <p:txBody>
+          <a:bodyPr/>
+          <a:lstStyle/>
+          <a:p>
+            <a:r>
+              <a:rPr lang="en-US" dirty="0"/>
+              <a:t>Tests</a:t>
+            </a:r>
+            <a:endParaRPr lang="en-CH" dirty="0"/>
+          </a:p>
+        </p:txBody>
+      </p:sp>
+      <p:sp>
+        <p:nvSpPr>
+          <p:cNvPr id="3" name="Content Placeholder 2">
+            <a:extLst>
+              <a:ext uri="{FF2B5EF4-FFF2-40B4-BE49-F238E27FC236}">
+                <a16:creationId xmlns:a16="http://schemas.microsoft.com/office/drawing/2014/main" id="{864B24AE-FEF9-11D8-3905-D932A3046EB4}"/>
+              </a:ext>
+            </a:extLst>
+          </p:cNvPr>
+          <p:cNvSpPr>
+            <a:spLocks noGrp="1"/>
+          </p:cNvSpPr>
+          <p:nvPr>
+            <p:ph idx="1"/>
+          </p:nvPr>
+        </p:nvSpPr>
+        <p:spPr/>
+        <p:txBody>
+          <a:bodyPr/>
+          <a:lstStyle/>
+          <a:p>
+            <a:r>
+              <a:rPr lang="en-US" dirty="0" err="1">
+                <a:latin typeface="Arial" panose="020B0604020202020204" pitchFamily="34" charset="0"/>
+                <a:cs typeface="Arial" panose="020B0604020202020204" pitchFamily="34" charset="0"/>
+              </a:rPr>
+              <a:t>Testkonzept</a:t>
+            </a:r>
+            <a:endParaRPr lang="en-US" dirty="0">
+              <a:latin typeface="Arial" panose="020B0604020202020204" pitchFamily="34" charset="0"/>
+              <a:cs typeface="Arial" panose="020B0604020202020204" pitchFamily="34" charset="0"/>
+            </a:endParaRPr>
+          </a:p>
+          <a:p>
+            <a:pPr lvl="1"/>
+            <a:r>
+              <a:rPr lang="en-US" dirty="0" err="1">
+                <a:latin typeface="Arial" panose="020B0604020202020204" pitchFamily="34" charset="0"/>
+                <a:cs typeface="Arial" panose="020B0604020202020204" pitchFamily="34" charset="0"/>
+              </a:rPr>
+              <a:t>Herausgezögert</a:t>
+            </a:r>
+            <a:endParaRPr lang="en-US" dirty="0">
+              <a:latin typeface="Arial" panose="020B0604020202020204" pitchFamily="34" charset="0"/>
+              <a:cs typeface="Arial" panose="020B0604020202020204" pitchFamily="34" charset="0"/>
+            </a:endParaRPr>
+          </a:p>
+          <a:p>
+            <a:r>
+              <a:rPr lang="en-US" dirty="0" err="1">
+                <a:latin typeface="Arial" panose="020B0604020202020204" pitchFamily="34" charset="0"/>
+                <a:cs typeface="Arial" panose="020B0604020202020204" pitchFamily="34" charset="0"/>
+              </a:rPr>
+              <a:t>Testdurchführung</a:t>
+            </a:r>
+            <a:endParaRPr lang="en-US" dirty="0">
+              <a:latin typeface="Arial" panose="020B0604020202020204" pitchFamily="34" charset="0"/>
+              <a:cs typeface="Arial" panose="020B0604020202020204" pitchFamily="34" charset="0"/>
+            </a:endParaRPr>
+          </a:p>
+          <a:p>
+            <a:endParaRPr lang="en-CH" dirty="0"/>
+          </a:p>
+        </p:txBody>
+      </p:sp>
+      <p:graphicFrame>
+        <p:nvGraphicFramePr>
+          <p:cNvPr id="4" name="Table 3">
+            <a:extLst>
+              <a:ext uri="{FF2B5EF4-FFF2-40B4-BE49-F238E27FC236}">
+                <a16:creationId xmlns:a16="http://schemas.microsoft.com/office/drawing/2014/main" id="{DF40377E-7B26-500B-83E2-E9D474834822}"/>
+              </a:ext>
+            </a:extLst>
+          </p:cNvPr>
+          <p:cNvGraphicFramePr>
+            <a:graphicFrameLocks noGrp="1"/>
+          </p:cNvGraphicFramePr>
+          <p:nvPr>
+            <p:extLst>
+              <p:ext uri="{D42A27DB-BD31-4B8C-83A1-F6EECF244321}">
+                <p14:modId xmlns:p14="http://schemas.microsoft.com/office/powerpoint/2010/main" val="3344968455"/>
+              </p:ext>
+            </p:extLst>
+          </p:nvPr>
+        </p:nvGraphicFramePr>
+        <p:xfrm>
+          <a:off x="1228508" y="3566795"/>
+          <a:ext cx="6864070" cy="3108960"/>
+        </p:xfrm>
+        <a:graphic>
+          <a:graphicData uri="http://schemas.openxmlformats.org/drawingml/2006/table">
+            <a:tbl>
+              <a:tblPr firstRow="1" firstCol="1" bandRow="1">
+                <a:tableStyleId>{5C22544A-7EE6-4342-B048-85BDC9FD1C3A}</a:tableStyleId>
+              </a:tblPr>
+              <a:tblGrid>
+                <a:gridCol w="1092272">
+                  <a:extLst>
+                    <a:ext uri="{9D8B030D-6E8A-4147-A177-3AD203B41FA5}">
+                      <a16:colId xmlns:a16="http://schemas.microsoft.com/office/drawing/2014/main" val="3946127365"/>
+                    </a:ext>
+                  </a:extLst>
+                </a:gridCol>
+                <a:gridCol w="3099328">
+                  <a:extLst>
+                    <a:ext uri="{9D8B030D-6E8A-4147-A177-3AD203B41FA5}">
+                      <a16:colId xmlns:a16="http://schemas.microsoft.com/office/drawing/2014/main" val="832453433"/>
+                    </a:ext>
+                  </a:extLst>
+                </a:gridCol>
+                <a:gridCol w="1306018">
+                  <a:extLst>
+                    <a:ext uri="{9D8B030D-6E8A-4147-A177-3AD203B41FA5}">
+                      <a16:colId xmlns:a16="http://schemas.microsoft.com/office/drawing/2014/main" val="2188377391"/>
+                    </a:ext>
+                  </a:extLst>
+                </a:gridCol>
+                <a:gridCol w="1366452">
+                  <a:extLst>
+                    <a:ext uri="{9D8B030D-6E8A-4147-A177-3AD203B41FA5}">
+                      <a16:colId xmlns:a16="http://schemas.microsoft.com/office/drawing/2014/main" val="2973773564"/>
+                    </a:ext>
+                  </a:extLst>
+                </a:gridCol>
+              </a:tblGrid>
+              <a:tr h="153493">
+                <a:tc>
+                  <a:txBody>
+                    <a:bodyPr/>
+                    <a:lstStyle/>
+                    <a:p>
+                      <a:r>
+                        <a:rPr lang="de-DE" sz="1200">
+                          <a:effectLst/>
+                          <a:latin typeface="Arial" panose="020B0604020202020204" pitchFamily="34" charset="0"/>
+                          <a:cs typeface="Arial" panose="020B0604020202020204" pitchFamily="34" charset="0"/>
+                        </a:rPr>
+                        <a:t>Test Nr.</a:t>
+                      </a:r>
+                      <a:endParaRPr lang="en-CH" sz="1200">
+                        <a:effectLst/>
+                        <a:latin typeface="Arial" panose="020B0604020202020204" pitchFamily="34" charset="0"/>
+                        <a:ea typeface="Georgia" panose="02040502050405020303" pitchFamily="18" charset="0"/>
+                        <a:cs typeface="Arial" panose="020B0604020202020204" pitchFamily="34" charset="0"/>
+                      </a:endParaRPr>
+                    </a:p>
+                  </a:txBody>
+                  <a:tcPr marL="68580" marR="68580" marT="0" marB="0"/>
+                </a:tc>
+                <a:tc>
+                  <a:txBody>
+                    <a:bodyPr/>
+                    <a:lstStyle/>
+                    <a:p>
+                      <a:r>
+                        <a:rPr lang="de-DE" sz="1200">
+                          <a:effectLst/>
+                          <a:latin typeface="Arial" panose="020B0604020202020204" pitchFamily="34" charset="0"/>
+                          <a:cs typeface="Arial" panose="020B0604020202020204" pitchFamily="34" charset="0"/>
+                        </a:rPr>
+                        <a:t>Resultat</a:t>
+                      </a:r>
+                      <a:endParaRPr lang="en-CH" sz="1200">
+                        <a:effectLst/>
+                        <a:latin typeface="Arial" panose="020B0604020202020204" pitchFamily="34" charset="0"/>
+                        <a:ea typeface="Georgia" panose="02040502050405020303" pitchFamily="18" charset="0"/>
+                        <a:cs typeface="Arial" panose="020B0604020202020204" pitchFamily="34" charset="0"/>
+                      </a:endParaRPr>
+                    </a:p>
+                  </a:txBody>
+                  <a:tcPr marL="68580" marR="68580" marT="0" marB="0"/>
+                </a:tc>
+                <a:tc>
+                  <a:txBody>
+                    <a:bodyPr/>
+                    <a:lstStyle/>
+                    <a:p>
+                      <a:r>
+                        <a:rPr lang="de-DE" sz="1200">
+                          <a:effectLst/>
+                          <a:latin typeface="Arial" panose="020B0604020202020204" pitchFamily="34" charset="0"/>
+                          <a:cs typeface="Arial" panose="020B0604020202020204" pitchFamily="34" charset="0"/>
+                        </a:rPr>
+                        <a:t>Bestanden</a:t>
+                      </a:r>
+                      <a:endParaRPr lang="en-CH" sz="1200">
+                        <a:effectLst/>
+                        <a:latin typeface="Arial" panose="020B0604020202020204" pitchFamily="34" charset="0"/>
+                        <a:ea typeface="Georgia" panose="02040502050405020303" pitchFamily="18" charset="0"/>
+                        <a:cs typeface="Arial" panose="020B0604020202020204" pitchFamily="34" charset="0"/>
+                      </a:endParaRPr>
+                    </a:p>
+                  </a:txBody>
+                  <a:tcPr marL="68580" marR="68580" marT="0" marB="0"/>
+                </a:tc>
+                <a:tc>
+                  <a:txBody>
+                    <a:bodyPr/>
+                    <a:lstStyle/>
+                    <a:p>
+                      <a:r>
+                        <a:rPr lang="de-DE" sz="1200">
+                          <a:effectLst/>
+                          <a:latin typeface="Arial" panose="020B0604020202020204" pitchFamily="34" charset="0"/>
+                          <a:cs typeface="Arial" panose="020B0604020202020204" pitchFamily="34" charset="0"/>
+                        </a:rPr>
+                        <a:t>Durchgeführt von</a:t>
+                      </a:r>
+                      <a:endParaRPr lang="en-CH" sz="1200">
+                        <a:effectLst/>
+                        <a:latin typeface="Arial" panose="020B0604020202020204" pitchFamily="34" charset="0"/>
+                        <a:ea typeface="Georgia" panose="02040502050405020303" pitchFamily="18" charset="0"/>
+                        <a:cs typeface="Arial" panose="020B0604020202020204" pitchFamily="34" charset="0"/>
+                      </a:endParaRPr>
+                    </a:p>
+                  </a:txBody>
+                  <a:tcPr marL="68580" marR="68580" marT="0" marB="0"/>
+                </a:tc>
+                <a:extLst>
+                  <a:ext uri="{0D108BD9-81ED-4DB2-BD59-A6C34878D82A}">
+                    <a16:rowId xmlns:a16="http://schemas.microsoft.com/office/drawing/2014/main" val="881991265"/>
+                  </a:ext>
+                </a:extLst>
+              </a:tr>
+              <a:tr h="153493">
+                <a:tc>
+                  <a:txBody>
+                    <a:bodyPr/>
+                    <a:lstStyle/>
+                    <a:p>
+                      <a:r>
+                        <a:rPr lang="de-DE" sz="1200">
+                          <a:effectLst/>
+                          <a:latin typeface="Arial" panose="020B0604020202020204" pitchFamily="34" charset="0"/>
+                          <a:cs typeface="Arial" panose="020B0604020202020204" pitchFamily="34" charset="0"/>
+                        </a:rPr>
+                        <a:t>Testfall #1</a:t>
+                      </a:r>
+                      <a:endParaRPr lang="en-CH" sz="1200">
+                        <a:effectLst/>
+                        <a:latin typeface="Arial" panose="020B0604020202020204" pitchFamily="34" charset="0"/>
+                        <a:ea typeface="Georgia" panose="02040502050405020303" pitchFamily="18" charset="0"/>
+                        <a:cs typeface="Arial" panose="020B0604020202020204" pitchFamily="34" charset="0"/>
+                      </a:endParaRPr>
+                    </a:p>
+                  </a:txBody>
+                  <a:tcPr marL="68580" marR="68580" marT="0" marB="0"/>
+                </a:tc>
+                <a:tc>
+                  <a:txBody>
+                    <a:bodyPr/>
+                    <a:lstStyle/>
+                    <a:p>
+                      <a:r>
+                        <a:rPr lang="de-DE" sz="1200">
+                          <a:effectLst/>
+                          <a:latin typeface="Arial" panose="020B0604020202020204" pitchFamily="34" charset="0"/>
+                          <a:cs typeface="Arial" panose="020B0604020202020204" pitchFamily="34" charset="0"/>
+                        </a:rPr>
+                        <a:t>Der User wird eingeloggt</a:t>
+                      </a:r>
+                      <a:endParaRPr lang="en-CH" sz="1200">
+                        <a:effectLst/>
+                        <a:latin typeface="Arial" panose="020B0604020202020204" pitchFamily="34" charset="0"/>
+                        <a:ea typeface="Georgia" panose="02040502050405020303" pitchFamily="18" charset="0"/>
+                        <a:cs typeface="Arial" panose="020B0604020202020204" pitchFamily="34" charset="0"/>
+                      </a:endParaRPr>
+                    </a:p>
+                  </a:txBody>
+                  <a:tcPr marL="68580" marR="68580" marT="0" marB="0"/>
+                </a:tc>
+                <a:tc>
+                  <a:txBody>
+                    <a:bodyPr/>
+                    <a:lstStyle/>
+                    <a:p>
+                      <a:r>
+                        <a:rPr lang="de-DE" sz="1200">
+                          <a:effectLst/>
+                          <a:latin typeface="Arial" panose="020B0604020202020204" pitchFamily="34" charset="0"/>
+                          <a:cs typeface="Arial" panose="020B0604020202020204" pitchFamily="34" charset="0"/>
+                        </a:rPr>
+                        <a:t>Bestanden</a:t>
+                      </a:r>
+                      <a:endParaRPr lang="en-CH" sz="1200">
+                        <a:effectLst/>
+                        <a:latin typeface="Arial" panose="020B0604020202020204" pitchFamily="34" charset="0"/>
+                        <a:ea typeface="Georgia" panose="02040502050405020303" pitchFamily="18" charset="0"/>
+                        <a:cs typeface="Arial" panose="020B0604020202020204" pitchFamily="34" charset="0"/>
+                      </a:endParaRPr>
+                    </a:p>
+                  </a:txBody>
+                  <a:tcPr marL="68580" marR="68580" marT="0" marB="0"/>
+                </a:tc>
+                <a:tc>
+                  <a:txBody>
+                    <a:bodyPr/>
+                    <a:lstStyle/>
+                    <a:p>
+                      <a:r>
+                        <a:rPr lang="de-DE" sz="1200">
+                          <a:effectLst/>
+                          <a:latin typeface="Arial" panose="020B0604020202020204" pitchFamily="34" charset="0"/>
+                          <a:cs typeface="Arial" panose="020B0604020202020204" pitchFamily="34" charset="0"/>
+                        </a:rPr>
+                        <a:t>Sven Merz</a:t>
+                      </a:r>
+                      <a:endParaRPr lang="en-CH" sz="1200">
+                        <a:effectLst/>
+                        <a:latin typeface="Arial" panose="020B0604020202020204" pitchFamily="34" charset="0"/>
+                        <a:ea typeface="Georgia" panose="02040502050405020303" pitchFamily="18" charset="0"/>
+                        <a:cs typeface="Arial" panose="020B0604020202020204" pitchFamily="34" charset="0"/>
+                      </a:endParaRPr>
+                    </a:p>
+                  </a:txBody>
+                  <a:tcPr marL="68580" marR="68580" marT="0" marB="0"/>
+                </a:tc>
+                <a:extLst>
+                  <a:ext uri="{0D108BD9-81ED-4DB2-BD59-A6C34878D82A}">
+                    <a16:rowId xmlns:a16="http://schemas.microsoft.com/office/drawing/2014/main" val="1651287230"/>
+                  </a:ext>
+                </a:extLst>
+              </a:tr>
+              <a:tr h="306986">
+                <a:tc>
+                  <a:txBody>
+                    <a:bodyPr/>
+                    <a:lstStyle/>
+                    <a:p>
+                      <a:r>
+                        <a:rPr lang="de-DE" sz="1200">
+                          <a:effectLst/>
+                          <a:latin typeface="Arial" panose="020B0604020202020204" pitchFamily="34" charset="0"/>
+                          <a:cs typeface="Arial" panose="020B0604020202020204" pitchFamily="34" charset="0"/>
+                        </a:rPr>
+                        <a:t>Testfall #2</a:t>
+                      </a:r>
+                      <a:endParaRPr lang="en-CH" sz="1200">
+                        <a:effectLst/>
+                        <a:latin typeface="Arial" panose="020B0604020202020204" pitchFamily="34" charset="0"/>
+                        <a:ea typeface="Georgia" panose="02040502050405020303" pitchFamily="18" charset="0"/>
+                        <a:cs typeface="Arial" panose="020B0604020202020204" pitchFamily="34" charset="0"/>
+                      </a:endParaRPr>
+                    </a:p>
+                  </a:txBody>
+                  <a:tcPr marL="68580" marR="68580" marT="0" marB="0"/>
+                </a:tc>
+                <a:tc>
+                  <a:txBody>
+                    <a:bodyPr/>
+                    <a:lstStyle/>
+                    <a:p>
+                      <a:r>
+                        <a:rPr lang="de-DE" sz="1200">
+                          <a:effectLst/>
+                          <a:latin typeface="Arial" panose="020B0604020202020204" pitchFamily="34" charset="0"/>
+                          <a:cs typeface="Arial" panose="020B0604020202020204" pitchFamily="34" charset="0"/>
+                        </a:rPr>
+                        <a:t>Der User wird nicht eingeloggt und Feedback wird gegeben</a:t>
+                      </a:r>
+                      <a:endParaRPr lang="en-CH" sz="1200">
+                        <a:effectLst/>
+                        <a:latin typeface="Arial" panose="020B0604020202020204" pitchFamily="34" charset="0"/>
+                        <a:ea typeface="Georgia" panose="02040502050405020303" pitchFamily="18" charset="0"/>
+                        <a:cs typeface="Arial" panose="020B0604020202020204" pitchFamily="34" charset="0"/>
+                      </a:endParaRPr>
+                    </a:p>
+                  </a:txBody>
+                  <a:tcPr marL="68580" marR="68580" marT="0" marB="0"/>
+                </a:tc>
+                <a:tc>
+                  <a:txBody>
+                    <a:bodyPr/>
+                    <a:lstStyle/>
+                    <a:p>
+                      <a:r>
+                        <a:rPr lang="de-DE" sz="1200">
+                          <a:effectLst/>
+                          <a:latin typeface="Arial" panose="020B0604020202020204" pitchFamily="34" charset="0"/>
+                          <a:cs typeface="Arial" panose="020B0604020202020204" pitchFamily="34" charset="0"/>
+                        </a:rPr>
+                        <a:t>Bestanden</a:t>
+                      </a:r>
+                      <a:endParaRPr lang="en-CH" sz="1200">
+                        <a:effectLst/>
+                        <a:latin typeface="Arial" panose="020B0604020202020204" pitchFamily="34" charset="0"/>
+                        <a:ea typeface="Georgia" panose="02040502050405020303" pitchFamily="18" charset="0"/>
+                        <a:cs typeface="Arial" panose="020B0604020202020204" pitchFamily="34" charset="0"/>
+                      </a:endParaRPr>
+                    </a:p>
+                  </a:txBody>
+                  <a:tcPr marL="68580" marR="68580" marT="0" marB="0"/>
+                </a:tc>
+                <a:tc>
+                  <a:txBody>
+                    <a:bodyPr/>
+                    <a:lstStyle/>
+                    <a:p>
+                      <a:r>
+                        <a:rPr lang="de-DE" sz="1200">
+                          <a:effectLst/>
+                          <a:latin typeface="Arial" panose="020B0604020202020204" pitchFamily="34" charset="0"/>
+                          <a:cs typeface="Arial" panose="020B0604020202020204" pitchFamily="34" charset="0"/>
+                        </a:rPr>
+                        <a:t>Sven Merz</a:t>
+                      </a:r>
+                      <a:endParaRPr lang="en-CH" sz="1200">
+                        <a:effectLst/>
+                        <a:latin typeface="Arial" panose="020B0604020202020204" pitchFamily="34" charset="0"/>
+                        <a:ea typeface="Georgia" panose="02040502050405020303" pitchFamily="18" charset="0"/>
+                        <a:cs typeface="Arial" panose="020B0604020202020204" pitchFamily="34" charset="0"/>
+                      </a:endParaRPr>
+                    </a:p>
+                  </a:txBody>
+                  <a:tcPr marL="68580" marR="68580" marT="0" marB="0"/>
+                </a:tc>
+                <a:extLst>
+                  <a:ext uri="{0D108BD9-81ED-4DB2-BD59-A6C34878D82A}">
+                    <a16:rowId xmlns:a16="http://schemas.microsoft.com/office/drawing/2014/main" val="1796380957"/>
+                  </a:ext>
+                </a:extLst>
+              </a:tr>
+              <a:tr h="153493">
+                <a:tc>
+                  <a:txBody>
+                    <a:bodyPr/>
+                    <a:lstStyle/>
+                    <a:p>
+                      <a:r>
+                        <a:rPr lang="de-DE" sz="1200">
+                          <a:effectLst/>
+                          <a:latin typeface="Arial" panose="020B0604020202020204" pitchFamily="34" charset="0"/>
+                          <a:cs typeface="Arial" panose="020B0604020202020204" pitchFamily="34" charset="0"/>
+                        </a:rPr>
+                        <a:t>Testfall #3</a:t>
+                      </a:r>
+                      <a:endParaRPr lang="en-CH" sz="1200">
+                        <a:effectLst/>
+                        <a:latin typeface="Arial" panose="020B0604020202020204" pitchFamily="34" charset="0"/>
+                        <a:ea typeface="Georgia" panose="02040502050405020303" pitchFamily="18" charset="0"/>
+                        <a:cs typeface="Arial" panose="020B0604020202020204" pitchFamily="34" charset="0"/>
+                      </a:endParaRPr>
+                    </a:p>
+                  </a:txBody>
+                  <a:tcPr marL="68580" marR="68580" marT="0" marB="0"/>
+                </a:tc>
+                <a:tc>
+                  <a:txBody>
+                    <a:bodyPr/>
+                    <a:lstStyle/>
+                    <a:p>
+                      <a:r>
+                        <a:rPr lang="de-DE" sz="1200">
+                          <a:effectLst/>
+                          <a:latin typeface="Arial" panose="020B0604020202020204" pitchFamily="34" charset="0"/>
+                          <a:cs typeface="Arial" panose="020B0604020202020204" pitchFamily="34" charset="0"/>
+                        </a:rPr>
+                        <a:t>Der User wird erstellt</a:t>
+                      </a:r>
+                      <a:endParaRPr lang="en-CH" sz="1200">
+                        <a:effectLst/>
+                        <a:latin typeface="Arial" panose="020B0604020202020204" pitchFamily="34" charset="0"/>
+                        <a:ea typeface="Georgia" panose="02040502050405020303" pitchFamily="18" charset="0"/>
+                        <a:cs typeface="Arial" panose="020B0604020202020204" pitchFamily="34" charset="0"/>
+                      </a:endParaRPr>
+                    </a:p>
+                  </a:txBody>
+                  <a:tcPr marL="68580" marR="68580" marT="0" marB="0"/>
+                </a:tc>
+                <a:tc>
+                  <a:txBody>
+                    <a:bodyPr/>
+                    <a:lstStyle/>
+                    <a:p>
+                      <a:r>
+                        <a:rPr lang="de-DE" sz="1200">
+                          <a:effectLst/>
+                          <a:latin typeface="Arial" panose="020B0604020202020204" pitchFamily="34" charset="0"/>
+                          <a:cs typeface="Arial" panose="020B0604020202020204" pitchFamily="34" charset="0"/>
+                        </a:rPr>
+                        <a:t>Bestanden</a:t>
+                      </a:r>
+                      <a:endParaRPr lang="en-CH" sz="1200">
+                        <a:effectLst/>
+                        <a:latin typeface="Arial" panose="020B0604020202020204" pitchFamily="34" charset="0"/>
+                        <a:ea typeface="Georgia" panose="02040502050405020303" pitchFamily="18" charset="0"/>
+                        <a:cs typeface="Arial" panose="020B0604020202020204" pitchFamily="34" charset="0"/>
+                      </a:endParaRPr>
+                    </a:p>
+                  </a:txBody>
+                  <a:tcPr marL="68580" marR="68580" marT="0" marB="0"/>
+                </a:tc>
+                <a:tc>
+                  <a:txBody>
+                    <a:bodyPr/>
+                    <a:lstStyle/>
+                    <a:p>
+                      <a:r>
+                        <a:rPr lang="de-DE" sz="1200">
+                          <a:effectLst/>
+                          <a:latin typeface="Arial" panose="020B0604020202020204" pitchFamily="34" charset="0"/>
+                          <a:cs typeface="Arial" panose="020B0604020202020204" pitchFamily="34" charset="0"/>
+                        </a:rPr>
+                        <a:t>Sven Merz</a:t>
+                      </a:r>
+                      <a:endParaRPr lang="en-CH" sz="1200">
+                        <a:effectLst/>
+                        <a:latin typeface="Arial" panose="020B0604020202020204" pitchFamily="34" charset="0"/>
+                        <a:ea typeface="Georgia" panose="02040502050405020303" pitchFamily="18" charset="0"/>
+                        <a:cs typeface="Arial" panose="020B0604020202020204" pitchFamily="34" charset="0"/>
+                      </a:endParaRPr>
+                    </a:p>
+                  </a:txBody>
+                  <a:tcPr marL="68580" marR="68580" marT="0" marB="0"/>
+                </a:tc>
+                <a:extLst>
+                  <a:ext uri="{0D108BD9-81ED-4DB2-BD59-A6C34878D82A}">
+                    <a16:rowId xmlns:a16="http://schemas.microsoft.com/office/drawing/2014/main" val="445228017"/>
+                  </a:ext>
+                </a:extLst>
+              </a:tr>
+              <a:tr h="306986">
+                <a:tc>
+                  <a:txBody>
+                    <a:bodyPr/>
+                    <a:lstStyle/>
+                    <a:p>
+                      <a:r>
+                        <a:rPr lang="de-DE" sz="1200">
+                          <a:effectLst/>
+                          <a:latin typeface="Arial" panose="020B0604020202020204" pitchFamily="34" charset="0"/>
+                          <a:cs typeface="Arial" panose="020B0604020202020204" pitchFamily="34" charset="0"/>
+                        </a:rPr>
+                        <a:t>Testfall #4</a:t>
+                      </a:r>
+                      <a:endParaRPr lang="en-CH" sz="1200">
+                        <a:effectLst/>
+                        <a:latin typeface="Arial" panose="020B0604020202020204" pitchFamily="34" charset="0"/>
+                        <a:ea typeface="Georgia" panose="02040502050405020303" pitchFamily="18" charset="0"/>
+                        <a:cs typeface="Arial" panose="020B0604020202020204" pitchFamily="34" charset="0"/>
+                      </a:endParaRPr>
+                    </a:p>
+                  </a:txBody>
+                  <a:tcPr marL="68580" marR="68580" marT="0" marB="0"/>
+                </a:tc>
+                <a:tc>
+                  <a:txBody>
+                    <a:bodyPr/>
+                    <a:lstStyle/>
+                    <a:p>
+                      <a:r>
+                        <a:rPr lang="de-DE" sz="1200">
+                          <a:effectLst/>
+                          <a:latin typeface="Arial" panose="020B0604020202020204" pitchFamily="34" charset="0"/>
+                          <a:cs typeface="Arial" panose="020B0604020202020204" pitchFamily="34" charset="0"/>
+                        </a:rPr>
+                        <a:t>Der User wird nicht erstellt und die falschen Daten werden angezeigt</a:t>
+                      </a:r>
+                      <a:endParaRPr lang="en-CH" sz="1200">
+                        <a:effectLst/>
+                        <a:latin typeface="Arial" panose="020B0604020202020204" pitchFamily="34" charset="0"/>
+                        <a:ea typeface="Georgia" panose="02040502050405020303" pitchFamily="18" charset="0"/>
+                        <a:cs typeface="Arial" panose="020B0604020202020204" pitchFamily="34" charset="0"/>
+                      </a:endParaRPr>
+                    </a:p>
+                  </a:txBody>
+                  <a:tcPr marL="68580" marR="68580" marT="0" marB="0"/>
+                </a:tc>
+                <a:tc>
+                  <a:txBody>
+                    <a:bodyPr/>
+                    <a:lstStyle/>
+                    <a:p>
+                      <a:r>
+                        <a:rPr lang="de-DE" sz="1200">
+                          <a:effectLst/>
+                          <a:latin typeface="Arial" panose="020B0604020202020204" pitchFamily="34" charset="0"/>
+                          <a:cs typeface="Arial" panose="020B0604020202020204" pitchFamily="34" charset="0"/>
+                        </a:rPr>
+                        <a:t>Bestanden</a:t>
+                      </a:r>
+                      <a:endParaRPr lang="en-CH" sz="1200">
+                        <a:effectLst/>
+                        <a:latin typeface="Arial" panose="020B0604020202020204" pitchFamily="34" charset="0"/>
+                        <a:ea typeface="Georgia" panose="02040502050405020303" pitchFamily="18" charset="0"/>
+                        <a:cs typeface="Arial" panose="020B0604020202020204" pitchFamily="34" charset="0"/>
+                      </a:endParaRPr>
+                    </a:p>
+                  </a:txBody>
+                  <a:tcPr marL="68580" marR="68580" marT="0" marB="0"/>
+                </a:tc>
+                <a:tc>
+                  <a:txBody>
+                    <a:bodyPr/>
+                    <a:lstStyle/>
+                    <a:p>
+                      <a:r>
+                        <a:rPr lang="de-DE" sz="1200">
+                          <a:effectLst/>
+                          <a:latin typeface="Arial" panose="020B0604020202020204" pitchFamily="34" charset="0"/>
+                          <a:cs typeface="Arial" panose="020B0604020202020204" pitchFamily="34" charset="0"/>
+                        </a:rPr>
+                        <a:t>Sven Merz</a:t>
+                      </a:r>
+                      <a:endParaRPr lang="en-CH" sz="1200">
+                        <a:effectLst/>
+                        <a:latin typeface="Arial" panose="020B0604020202020204" pitchFamily="34" charset="0"/>
+                        <a:ea typeface="Georgia" panose="02040502050405020303" pitchFamily="18" charset="0"/>
+                        <a:cs typeface="Arial" panose="020B0604020202020204" pitchFamily="34" charset="0"/>
+                      </a:endParaRPr>
+                    </a:p>
+                  </a:txBody>
+                  <a:tcPr marL="68580" marR="68580" marT="0" marB="0"/>
+                </a:tc>
+                <a:extLst>
+                  <a:ext uri="{0D108BD9-81ED-4DB2-BD59-A6C34878D82A}">
+                    <a16:rowId xmlns:a16="http://schemas.microsoft.com/office/drawing/2014/main" val="3492897671"/>
+                  </a:ext>
+                </a:extLst>
+              </a:tr>
+              <a:tr h="153493">
+                <a:tc>
+                  <a:txBody>
+                    <a:bodyPr/>
+                    <a:lstStyle/>
+                    <a:p>
+                      <a:r>
+                        <a:rPr lang="de-DE" sz="1200">
+                          <a:effectLst/>
+                          <a:latin typeface="Arial" panose="020B0604020202020204" pitchFamily="34" charset="0"/>
+                          <a:cs typeface="Arial" panose="020B0604020202020204" pitchFamily="34" charset="0"/>
+                        </a:rPr>
+                        <a:t>Testfall #5</a:t>
+                      </a:r>
+                      <a:endParaRPr lang="en-CH" sz="1200">
+                        <a:effectLst/>
+                        <a:latin typeface="Arial" panose="020B0604020202020204" pitchFamily="34" charset="0"/>
+                        <a:ea typeface="Georgia" panose="02040502050405020303" pitchFamily="18" charset="0"/>
+                        <a:cs typeface="Arial" panose="020B0604020202020204" pitchFamily="34" charset="0"/>
+                      </a:endParaRPr>
+                    </a:p>
+                  </a:txBody>
+                  <a:tcPr marL="68580" marR="68580" marT="0" marB="0"/>
+                </a:tc>
+                <a:tc>
+                  <a:txBody>
+                    <a:bodyPr/>
+                    <a:lstStyle/>
+                    <a:p>
+                      <a:r>
+                        <a:rPr lang="de-DE" sz="1200">
+                          <a:effectLst/>
+                          <a:latin typeface="Arial" panose="020B0604020202020204" pitchFamily="34" charset="0"/>
+                          <a:cs typeface="Arial" panose="020B0604020202020204" pitchFamily="34" charset="0"/>
+                        </a:rPr>
+                        <a:t>ToDo wird erstellt und angezeigt</a:t>
+                      </a:r>
+                      <a:endParaRPr lang="en-CH" sz="1200">
+                        <a:effectLst/>
+                        <a:latin typeface="Arial" panose="020B0604020202020204" pitchFamily="34" charset="0"/>
+                        <a:ea typeface="Georgia" panose="02040502050405020303" pitchFamily="18" charset="0"/>
+                        <a:cs typeface="Arial" panose="020B0604020202020204" pitchFamily="34" charset="0"/>
+                      </a:endParaRPr>
+                    </a:p>
+                  </a:txBody>
+                  <a:tcPr marL="68580" marR="68580" marT="0" marB="0"/>
+                </a:tc>
+                <a:tc>
+                  <a:txBody>
+                    <a:bodyPr/>
+                    <a:lstStyle/>
+                    <a:p>
+                      <a:r>
+                        <a:rPr lang="de-DE" sz="1200">
+                          <a:effectLst/>
+                          <a:latin typeface="Arial" panose="020B0604020202020204" pitchFamily="34" charset="0"/>
+                          <a:cs typeface="Arial" panose="020B0604020202020204" pitchFamily="34" charset="0"/>
+                        </a:rPr>
+                        <a:t>Bestanden</a:t>
+                      </a:r>
+                      <a:endParaRPr lang="en-CH" sz="1200">
+                        <a:effectLst/>
+                        <a:latin typeface="Arial" panose="020B0604020202020204" pitchFamily="34" charset="0"/>
+                        <a:ea typeface="Georgia" panose="02040502050405020303" pitchFamily="18" charset="0"/>
+                        <a:cs typeface="Arial" panose="020B0604020202020204" pitchFamily="34" charset="0"/>
+                      </a:endParaRPr>
+                    </a:p>
+                  </a:txBody>
+                  <a:tcPr marL="68580" marR="68580" marT="0" marB="0"/>
+                </a:tc>
+                <a:tc>
+                  <a:txBody>
+                    <a:bodyPr/>
+                    <a:lstStyle/>
+                    <a:p>
+                      <a:r>
+                        <a:rPr lang="de-DE" sz="1200">
+                          <a:effectLst/>
+                          <a:latin typeface="Arial" panose="020B0604020202020204" pitchFamily="34" charset="0"/>
+                          <a:cs typeface="Arial" panose="020B0604020202020204" pitchFamily="34" charset="0"/>
+                        </a:rPr>
+                        <a:t>Sven Merz</a:t>
+                      </a:r>
+                      <a:endParaRPr lang="en-CH" sz="1200">
+                        <a:effectLst/>
+                        <a:latin typeface="Arial" panose="020B0604020202020204" pitchFamily="34" charset="0"/>
+                        <a:ea typeface="Georgia" panose="02040502050405020303" pitchFamily="18" charset="0"/>
+                        <a:cs typeface="Arial" panose="020B0604020202020204" pitchFamily="34" charset="0"/>
+                      </a:endParaRPr>
+                    </a:p>
+                  </a:txBody>
+                  <a:tcPr marL="68580" marR="68580" marT="0" marB="0"/>
+                </a:tc>
+                <a:extLst>
+                  <a:ext uri="{0D108BD9-81ED-4DB2-BD59-A6C34878D82A}">
+                    <a16:rowId xmlns:a16="http://schemas.microsoft.com/office/drawing/2014/main" val="2336574579"/>
+                  </a:ext>
+                </a:extLst>
+              </a:tr>
+              <a:tr h="306986">
+                <a:tc>
+                  <a:txBody>
+                    <a:bodyPr/>
+                    <a:lstStyle/>
+                    <a:p>
+                      <a:r>
+                        <a:rPr lang="de-DE" sz="1200">
+                          <a:effectLst/>
+                          <a:latin typeface="Arial" panose="020B0604020202020204" pitchFamily="34" charset="0"/>
+                          <a:cs typeface="Arial" panose="020B0604020202020204" pitchFamily="34" charset="0"/>
+                        </a:rPr>
+                        <a:t>Testfall #6</a:t>
+                      </a:r>
+                      <a:endParaRPr lang="en-CH" sz="1200">
+                        <a:effectLst/>
+                        <a:latin typeface="Arial" panose="020B0604020202020204" pitchFamily="34" charset="0"/>
+                        <a:ea typeface="Georgia" panose="02040502050405020303" pitchFamily="18" charset="0"/>
+                        <a:cs typeface="Arial" panose="020B0604020202020204" pitchFamily="34" charset="0"/>
+                      </a:endParaRPr>
+                    </a:p>
+                  </a:txBody>
+                  <a:tcPr marL="68580" marR="68580" marT="0" marB="0"/>
+                </a:tc>
+                <a:tc>
+                  <a:txBody>
+                    <a:bodyPr/>
+                    <a:lstStyle/>
+                    <a:p>
+                      <a:r>
+                        <a:rPr lang="de-DE" sz="1200" dirty="0" err="1">
+                          <a:effectLst/>
+                          <a:latin typeface="Arial" panose="020B0604020202020204" pitchFamily="34" charset="0"/>
+                          <a:cs typeface="Arial" panose="020B0604020202020204" pitchFamily="34" charset="0"/>
+                        </a:rPr>
+                        <a:t>ToDo</a:t>
+                      </a:r>
+                      <a:r>
+                        <a:rPr lang="de-DE" sz="1200" dirty="0">
+                          <a:effectLst/>
+                          <a:latin typeface="Arial" panose="020B0604020202020204" pitchFamily="34" charset="0"/>
+                          <a:cs typeface="Arial" panose="020B0604020202020204" pitchFamily="34" charset="0"/>
+                        </a:rPr>
+                        <a:t> wird nicht erstellt und die Fehlermeldung wird im GUI angezeigt</a:t>
+                      </a:r>
+                      <a:endParaRPr lang="en-CH" sz="1200" dirty="0">
+                        <a:effectLst/>
+                        <a:latin typeface="Arial" panose="020B0604020202020204" pitchFamily="34" charset="0"/>
+                        <a:ea typeface="Georgia" panose="02040502050405020303" pitchFamily="18" charset="0"/>
+                        <a:cs typeface="Arial" panose="020B0604020202020204" pitchFamily="34" charset="0"/>
+                      </a:endParaRPr>
+                    </a:p>
+                  </a:txBody>
+                  <a:tcPr marL="68580" marR="68580" marT="0" marB="0"/>
+                </a:tc>
+                <a:tc>
+                  <a:txBody>
+                    <a:bodyPr/>
+                    <a:lstStyle/>
+                    <a:p>
+                      <a:r>
+                        <a:rPr lang="de-DE" sz="1200">
+                          <a:effectLst/>
+                          <a:latin typeface="Arial" panose="020B0604020202020204" pitchFamily="34" charset="0"/>
+                          <a:cs typeface="Arial" panose="020B0604020202020204" pitchFamily="34" charset="0"/>
+                        </a:rPr>
+                        <a:t>Bestanden</a:t>
+                      </a:r>
+                      <a:endParaRPr lang="en-CH" sz="1200">
+                        <a:effectLst/>
+                        <a:latin typeface="Arial" panose="020B0604020202020204" pitchFamily="34" charset="0"/>
+                        <a:ea typeface="Georgia" panose="02040502050405020303" pitchFamily="18" charset="0"/>
+                        <a:cs typeface="Arial" panose="020B0604020202020204" pitchFamily="34" charset="0"/>
+                      </a:endParaRPr>
+                    </a:p>
+                  </a:txBody>
+                  <a:tcPr marL="68580" marR="68580" marT="0" marB="0"/>
+                </a:tc>
+                <a:tc>
+                  <a:txBody>
+                    <a:bodyPr/>
+                    <a:lstStyle/>
+                    <a:p>
+                      <a:r>
+                        <a:rPr lang="de-DE" sz="1200">
+                          <a:effectLst/>
+                          <a:latin typeface="Arial" panose="020B0604020202020204" pitchFamily="34" charset="0"/>
+                          <a:cs typeface="Arial" panose="020B0604020202020204" pitchFamily="34" charset="0"/>
+                        </a:rPr>
+                        <a:t>Sven Merz</a:t>
+                      </a:r>
+                      <a:endParaRPr lang="en-CH" sz="1200">
+                        <a:effectLst/>
+                        <a:latin typeface="Arial" panose="020B0604020202020204" pitchFamily="34" charset="0"/>
+                        <a:ea typeface="Georgia" panose="02040502050405020303" pitchFamily="18" charset="0"/>
+                        <a:cs typeface="Arial" panose="020B0604020202020204" pitchFamily="34" charset="0"/>
+                      </a:endParaRPr>
+                    </a:p>
+                  </a:txBody>
+                  <a:tcPr marL="68580" marR="68580" marT="0" marB="0"/>
+                </a:tc>
+                <a:extLst>
+                  <a:ext uri="{0D108BD9-81ED-4DB2-BD59-A6C34878D82A}">
+                    <a16:rowId xmlns:a16="http://schemas.microsoft.com/office/drawing/2014/main" val="3188848320"/>
+                  </a:ext>
+                </a:extLst>
+              </a:tr>
+              <a:tr h="306986">
+                <a:tc>
+                  <a:txBody>
+                    <a:bodyPr/>
+                    <a:lstStyle/>
+                    <a:p>
+                      <a:r>
+                        <a:rPr lang="de-DE" sz="1200">
+                          <a:effectLst/>
+                          <a:latin typeface="Arial" panose="020B0604020202020204" pitchFamily="34" charset="0"/>
+                          <a:cs typeface="Arial" panose="020B0604020202020204" pitchFamily="34" charset="0"/>
+                        </a:rPr>
+                        <a:t>Testfall #7</a:t>
+                      </a:r>
+                      <a:endParaRPr lang="en-CH" sz="1200">
+                        <a:effectLst/>
+                        <a:latin typeface="Arial" panose="020B0604020202020204" pitchFamily="34" charset="0"/>
+                        <a:ea typeface="Georgia" panose="02040502050405020303" pitchFamily="18" charset="0"/>
+                        <a:cs typeface="Arial" panose="020B0604020202020204" pitchFamily="34" charset="0"/>
+                      </a:endParaRPr>
+                    </a:p>
+                  </a:txBody>
+                  <a:tcPr marL="68580" marR="68580" marT="0" marB="0"/>
+                </a:tc>
+                <a:tc>
+                  <a:txBody>
+                    <a:bodyPr/>
+                    <a:lstStyle/>
+                    <a:p>
+                      <a:r>
+                        <a:rPr lang="de-DE" sz="1200" dirty="0" err="1">
+                          <a:effectLst/>
+                          <a:latin typeface="Arial" panose="020B0604020202020204" pitchFamily="34" charset="0"/>
+                          <a:cs typeface="Arial" panose="020B0604020202020204" pitchFamily="34" charset="0"/>
+                        </a:rPr>
+                        <a:t>ToDo</a:t>
+                      </a:r>
+                      <a:r>
+                        <a:rPr lang="de-DE" sz="1200" dirty="0">
+                          <a:effectLst/>
+                          <a:latin typeface="Arial" panose="020B0604020202020204" pitchFamily="34" charset="0"/>
+                          <a:cs typeface="Arial" panose="020B0604020202020204" pitchFamily="34" charset="0"/>
+                        </a:rPr>
+                        <a:t> kann nicht editiert werden, weil die Page nicht existiert</a:t>
+                      </a:r>
+                      <a:endParaRPr lang="en-CH" sz="1200" dirty="0">
+                        <a:effectLst/>
+                        <a:latin typeface="Arial" panose="020B0604020202020204" pitchFamily="34" charset="0"/>
+                        <a:ea typeface="Georgia" panose="02040502050405020303" pitchFamily="18" charset="0"/>
+                        <a:cs typeface="Arial" panose="020B0604020202020204" pitchFamily="34" charset="0"/>
+                      </a:endParaRPr>
+                    </a:p>
+                  </a:txBody>
+                  <a:tcPr marL="68580" marR="68580" marT="0" marB="0"/>
+                </a:tc>
+                <a:tc>
+                  <a:txBody>
+                    <a:bodyPr/>
+                    <a:lstStyle/>
+                    <a:p>
+                      <a:r>
+                        <a:rPr lang="de-DE" sz="1200">
+                          <a:effectLst/>
+                          <a:latin typeface="Arial" panose="020B0604020202020204" pitchFamily="34" charset="0"/>
+                          <a:cs typeface="Arial" panose="020B0604020202020204" pitchFamily="34" charset="0"/>
+                        </a:rPr>
+                        <a:t>Nicht bestanden</a:t>
+                      </a:r>
+                      <a:endParaRPr lang="en-CH" sz="1200">
+                        <a:effectLst/>
+                        <a:latin typeface="Arial" panose="020B0604020202020204" pitchFamily="34" charset="0"/>
+                        <a:ea typeface="Georgia" panose="02040502050405020303" pitchFamily="18" charset="0"/>
+                        <a:cs typeface="Arial" panose="020B0604020202020204" pitchFamily="34" charset="0"/>
+                      </a:endParaRPr>
+                    </a:p>
+                  </a:txBody>
+                  <a:tcPr marL="68580" marR="68580" marT="0" marB="0"/>
+                </a:tc>
+                <a:tc>
+                  <a:txBody>
+                    <a:bodyPr/>
+                    <a:lstStyle/>
+                    <a:p>
+                      <a:r>
+                        <a:rPr lang="de-DE" sz="1200">
+                          <a:effectLst/>
+                          <a:latin typeface="Arial" panose="020B0604020202020204" pitchFamily="34" charset="0"/>
+                          <a:cs typeface="Arial" panose="020B0604020202020204" pitchFamily="34" charset="0"/>
+                        </a:rPr>
+                        <a:t>Sven Merz</a:t>
+                      </a:r>
+                      <a:endParaRPr lang="en-CH" sz="1200">
+                        <a:effectLst/>
+                        <a:latin typeface="Arial" panose="020B0604020202020204" pitchFamily="34" charset="0"/>
+                        <a:ea typeface="Georgia" panose="02040502050405020303" pitchFamily="18" charset="0"/>
+                        <a:cs typeface="Arial" panose="020B0604020202020204" pitchFamily="34" charset="0"/>
+                      </a:endParaRPr>
+                    </a:p>
+                  </a:txBody>
+                  <a:tcPr marL="68580" marR="68580" marT="0" marB="0"/>
+                </a:tc>
+                <a:extLst>
+                  <a:ext uri="{0D108BD9-81ED-4DB2-BD59-A6C34878D82A}">
+                    <a16:rowId xmlns:a16="http://schemas.microsoft.com/office/drawing/2014/main" val="825705793"/>
+                  </a:ext>
+                </a:extLst>
+              </a:tr>
+              <a:tr h="306986">
+                <a:tc>
+                  <a:txBody>
+                    <a:bodyPr/>
+                    <a:lstStyle/>
+                    <a:p>
+                      <a:r>
+                        <a:rPr lang="de-DE" sz="1200">
+                          <a:effectLst/>
+                          <a:latin typeface="Arial" panose="020B0604020202020204" pitchFamily="34" charset="0"/>
+                          <a:cs typeface="Arial" panose="020B0604020202020204" pitchFamily="34" charset="0"/>
+                        </a:rPr>
+                        <a:t>Testfall #8</a:t>
+                      </a:r>
+                      <a:endParaRPr lang="en-CH" sz="1200">
+                        <a:effectLst/>
+                        <a:latin typeface="Arial" panose="020B0604020202020204" pitchFamily="34" charset="0"/>
+                        <a:ea typeface="Georgia" panose="02040502050405020303" pitchFamily="18" charset="0"/>
+                        <a:cs typeface="Arial" panose="020B0604020202020204" pitchFamily="34" charset="0"/>
+                      </a:endParaRPr>
+                    </a:p>
+                  </a:txBody>
+                  <a:tcPr marL="68580" marR="68580" marT="0" marB="0"/>
+                </a:tc>
+                <a:tc>
+                  <a:txBody>
+                    <a:bodyPr/>
+                    <a:lstStyle/>
+                    <a:p>
+                      <a:r>
+                        <a:rPr lang="de-DE" sz="1200" dirty="0">
+                          <a:effectLst/>
+                          <a:latin typeface="Arial" panose="020B0604020202020204" pitchFamily="34" charset="0"/>
+                          <a:cs typeface="Arial" panose="020B0604020202020204" pitchFamily="34" charset="0"/>
+                        </a:rPr>
+                        <a:t>User kann nicht editiert werden, da die Page nicht existiert</a:t>
+                      </a:r>
+                      <a:endParaRPr lang="en-CH" sz="1200" dirty="0">
+                        <a:effectLst/>
+                        <a:latin typeface="Arial" panose="020B0604020202020204" pitchFamily="34" charset="0"/>
+                        <a:ea typeface="Georgia" panose="02040502050405020303" pitchFamily="18" charset="0"/>
+                        <a:cs typeface="Arial" panose="020B0604020202020204" pitchFamily="34" charset="0"/>
+                      </a:endParaRPr>
+                    </a:p>
+                  </a:txBody>
+                  <a:tcPr marL="68580" marR="68580" marT="0" marB="0"/>
+                </a:tc>
+                <a:tc>
+                  <a:txBody>
+                    <a:bodyPr/>
+                    <a:lstStyle/>
+                    <a:p>
+                      <a:r>
+                        <a:rPr lang="de-DE" sz="1200">
+                          <a:effectLst/>
+                          <a:latin typeface="Arial" panose="020B0604020202020204" pitchFamily="34" charset="0"/>
+                          <a:cs typeface="Arial" panose="020B0604020202020204" pitchFamily="34" charset="0"/>
+                        </a:rPr>
+                        <a:t>Nicht bestanden</a:t>
+                      </a:r>
+                      <a:endParaRPr lang="en-CH" sz="1200">
+                        <a:effectLst/>
+                        <a:latin typeface="Arial" panose="020B0604020202020204" pitchFamily="34" charset="0"/>
+                        <a:ea typeface="Georgia" panose="02040502050405020303" pitchFamily="18" charset="0"/>
+                        <a:cs typeface="Arial" panose="020B0604020202020204" pitchFamily="34" charset="0"/>
+                      </a:endParaRPr>
+                    </a:p>
+                  </a:txBody>
+                  <a:tcPr marL="68580" marR="68580" marT="0" marB="0"/>
+                </a:tc>
+                <a:tc>
+                  <a:txBody>
+                    <a:bodyPr/>
+                    <a:lstStyle/>
+                    <a:p>
+                      <a:r>
+                        <a:rPr lang="de-DE" sz="1200">
+                          <a:effectLst/>
+                          <a:latin typeface="Arial" panose="020B0604020202020204" pitchFamily="34" charset="0"/>
+                          <a:cs typeface="Arial" panose="020B0604020202020204" pitchFamily="34" charset="0"/>
+                        </a:rPr>
+                        <a:t>Sven Merz</a:t>
+                      </a:r>
+                      <a:endParaRPr lang="en-CH" sz="1200">
+                        <a:effectLst/>
+                        <a:latin typeface="Arial" panose="020B0604020202020204" pitchFamily="34" charset="0"/>
+                        <a:ea typeface="Georgia" panose="02040502050405020303" pitchFamily="18" charset="0"/>
+                        <a:cs typeface="Arial" panose="020B0604020202020204" pitchFamily="34" charset="0"/>
+                      </a:endParaRPr>
+                    </a:p>
+                  </a:txBody>
+                  <a:tcPr marL="68580" marR="68580" marT="0" marB="0"/>
+                </a:tc>
+                <a:extLst>
+                  <a:ext uri="{0D108BD9-81ED-4DB2-BD59-A6C34878D82A}">
+                    <a16:rowId xmlns:a16="http://schemas.microsoft.com/office/drawing/2014/main" val="881796493"/>
+                  </a:ext>
+                </a:extLst>
+              </a:tr>
+              <a:tr h="306986">
+                <a:tc>
+                  <a:txBody>
+                    <a:bodyPr/>
+                    <a:lstStyle/>
+                    <a:p>
+                      <a:r>
+                        <a:rPr lang="de-DE" sz="1200">
+                          <a:effectLst/>
+                          <a:latin typeface="Arial" panose="020B0604020202020204" pitchFamily="34" charset="0"/>
+                          <a:cs typeface="Arial" panose="020B0604020202020204" pitchFamily="34" charset="0"/>
+                        </a:rPr>
+                        <a:t>Testfall #9</a:t>
+                      </a:r>
+                      <a:endParaRPr lang="en-CH" sz="1200">
+                        <a:effectLst/>
+                        <a:latin typeface="Arial" panose="020B0604020202020204" pitchFamily="34" charset="0"/>
+                        <a:ea typeface="Georgia" panose="02040502050405020303" pitchFamily="18" charset="0"/>
+                        <a:cs typeface="Arial" panose="020B0604020202020204" pitchFamily="34" charset="0"/>
+                      </a:endParaRPr>
+                    </a:p>
+                  </a:txBody>
+                  <a:tcPr marL="68580" marR="68580" marT="0" marB="0"/>
+                </a:tc>
+                <a:tc>
+                  <a:txBody>
+                    <a:bodyPr/>
+                    <a:lstStyle/>
+                    <a:p>
+                      <a:r>
+                        <a:rPr lang="de-DE" sz="1200">
+                          <a:effectLst/>
+                          <a:latin typeface="Arial" panose="020B0604020202020204" pitchFamily="34" charset="0"/>
+                          <a:cs typeface="Arial" panose="020B0604020202020204" pitchFamily="34" charset="0"/>
+                        </a:rPr>
+                        <a:t>ToDo kann nicht editiert werden, da das Admin Panel nicht existiert</a:t>
+                      </a:r>
+                      <a:endParaRPr lang="en-CH" sz="1200">
+                        <a:effectLst/>
+                        <a:latin typeface="Arial" panose="020B0604020202020204" pitchFamily="34" charset="0"/>
+                        <a:ea typeface="Georgia" panose="02040502050405020303" pitchFamily="18" charset="0"/>
+                        <a:cs typeface="Arial" panose="020B0604020202020204" pitchFamily="34" charset="0"/>
+                      </a:endParaRPr>
+                    </a:p>
+                  </a:txBody>
+                  <a:tcPr marL="68580" marR="68580" marT="0" marB="0"/>
+                </a:tc>
+                <a:tc>
+                  <a:txBody>
+                    <a:bodyPr/>
+                    <a:lstStyle/>
+                    <a:p>
+                      <a:r>
+                        <a:rPr lang="de-DE" sz="1200">
+                          <a:effectLst/>
+                          <a:latin typeface="Arial" panose="020B0604020202020204" pitchFamily="34" charset="0"/>
+                          <a:cs typeface="Arial" panose="020B0604020202020204" pitchFamily="34" charset="0"/>
+                        </a:rPr>
+                        <a:t>Nicht bestanden</a:t>
+                      </a:r>
+                      <a:endParaRPr lang="en-CH" sz="1200">
+                        <a:effectLst/>
+                        <a:latin typeface="Arial" panose="020B0604020202020204" pitchFamily="34" charset="0"/>
+                        <a:ea typeface="Georgia" panose="02040502050405020303" pitchFamily="18" charset="0"/>
+                        <a:cs typeface="Arial" panose="020B0604020202020204" pitchFamily="34" charset="0"/>
+                      </a:endParaRPr>
+                    </a:p>
+                  </a:txBody>
+                  <a:tcPr marL="68580" marR="68580" marT="0" marB="0"/>
+                </a:tc>
+                <a:tc>
+                  <a:txBody>
+                    <a:bodyPr/>
+                    <a:lstStyle/>
+                    <a:p>
+                      <a:r>
+                        <a:rPr lang="de-DE" sz="1200" dirty="0">
+                          <a:effectLst/>
+                          <a:latin typeface="Arial" panose="020B0604020202020204" pitchFamily="34" charset="0"/>
+                          <a:cs typeface="Arial" panose="020B0604020202020204" pitchFamily="34" charset="0"/>
+                        </a:rPr>
+                        <a:t>Sven Merz</a:t>
+                      </a:r>
+                      <a:endParaRPr lang="en-CH" sz="1200" dirty="0">
+                        <a:effectLst/>
+                        <a:latin typeface="Arial" panose="020B0604020202020204" pitchFamily="34" charset="0"/>
+                        <a:ea typeface="Georgia" panose="02040502050405020303" pitchFamily="18" charset="0"/>
+                        <a:cs typeface="Arial" panose="020B0604020202020204" pitchFamily="34" charset="0"/>
+                      </a:endParaRPr>
+                    </a:p>
+                  </a:txBody>
+                  <a:tcPr marL="68580" marR="68580" marT="0" marB="0"/>
+                </a:tc>
+                <a:extLst>
+                  <a:ext uri="{0D108BD9-81ED-4DB2-BD59-A6C34878D82A}">
+                    <a16:rowId xmlns:a16="http://schemas.microsoft.com/office/drawing/2014/main" val="3425218134"/>
+                  </a:ext>
+                </a:extLst>
+              </a:tr>
+            </a:tbl>
+          </a:graphicData>
+        </a:graphic>
+      </p:graphicFrame>
+    </p:spTree>
+    <p:extLst>
+      <p:ext uri="{BB962C8B-B14F-4D97-AF65-F5344CB8AC3E}">
+        <p14:creationId xmlns:p14="http://schemas.microsoft.com/office/powerpoint/2010/main" val="586218260"/>
+      </p:ext>
+    </p:extLst>
+  </p:cSld>
+  <p:clrMapOvr>
+    <a:masterClrMapping/>
+  </p:clrMapOvr>
+</p:sld>
+</file>
+
+<file path=ppt/slides/slide14.xml><?xml version="1.0" encoding="utf-8"?>
+<p:sld xmlns:a="http://schemas.openxmlformats.org/drawingml/2006/main" xmlns:r="http://schemas.openxmlformats.org/officeDocument/2006/relationships" xmlns:p="http://schemas.openxmlformats.org/presentationml/2006/main">
+  <p:cSld>
+    <p:spTree>
+      <p:nvGrpSpPr>
+        <p:cNvPr id="1" name=""/>
+        <p:cNvGrpSpPr/>
+        <p:nvPr/>
+      </p:nvGrpSpPr>
+      <p:grpSpPr>
+        <a:xfrm>
+          <a:off x="0" y="0"/>
+          <a:ext cx="0" cy="0"/>
+          <a:chOff x="0" y="0"/>
+          <a:chExt cx="0" cy="0"/>
+        </a:xfrm>
+      </p:grpSpPr>
+      <p:sp>
+        <p:nvSpPr>
+          <p:cNvPr id="2" name="Title 1">
+            <a:extLst>
+              <a:ext uri="{FF2B5EF4-FFF2-40B4-BE49-F238E27FC236}">
+                <a16:creationId xmlns:a16="http://schemas.microsoft.com/office/drawing/2014/main" id="{7FAE4E69-2293-CB19-ABB5-5D0CDC9D74E4}"/>
+              </a:ext>
+            </a:extLst>
+          </p:cNvPr>
+          <p:cNvSpPr>
+            <a:spLocks noGrp="1"/>
+          </p:cNvSpPr>
+          <p:nvPr>
+            <p:ph type="title"/>
+          </p:nvPr>
+        </p:nvSpPr>
+        <p:spPr/>
+        <p:txBody>
+          <a:bodyPr/>
+          <a:lstStyle/>
+          <a:p>
+            <a:r>
+              <a:rPr lang="en-US" dirty="0" err="1"/>
+              <a:t>Ergebnis</a:t>
+            </a:r>
+            <a:endParaRPr lang="en-CH" dirty="0"/>
+          </a:p>
+        </p:txBody>
+      </p:sp>
+      <p:sp>
+        <p:nvSpPr>
+          <p:cNvPr id="3" name="Content Placeholder 2">
+            <a:extLst>
+              <a:ext uri="{FF2B5EF4-FFF2-40B4-BE49-F238E27FC236}">
+                <a16:creationId xmlns:a16="http://schemas.microsoft.com/office/drawing/2014/main" id="{EE12F980-F634-DB34-CC21-DA0A59EB46E2}"/>
+              </a:ext>
+            </a:extLst>
+          </p:cNvPr>
+          <p:cNvSpPr>
+            <a:spLocks noGrp="1"/>
+          </p:cNvSpPr>
+          <p:nvPr>
+            <p:ph idx="1"/>
+          </p:nvPr>
+        </p:nvSpPr>
+        <p:spPr/>
+        <p:txBody>
+          <a:bodyPr/>
+          <a:lstStyle/>
+          <a:p>
+            <a:r>
+              <a:rPr lang="en-US" dirty="0" err="1">
+                <a:latin typeface="Arial" panose="020B0604020202020204" pitchFamily="34" charset="0"/>
+                <a:cs typeface="Arial" panose="020B0604020202020204" pitchFamily="34" charset="0"/>
+              </a:rPr>
+              <a:t>Positiv</a:t>
+            </a:r>
+            <a:r>
+              <a:rPr lang="en-US" dirty="0">
+                <a:latin typeface="Arial" panose="020B0604020202020204" pitchFamily="34" charset="0"/>
+                <a:cs typeface="Arial" panose="020B0604020202020204" pitchFamily="34" charset="0"/>
+              </a:rPr>
+              <a:t>:</a:t>
+            </a:r>
+          </a:p>
+          <a:p>
+            <a:pPr lvl="1"/>
+            <a:r>
+              <a:rPr lang="en-US" dirty="0">
+                <a:latin typeface="Arial" panose="020B0604020202020204" pitchFamily="34" charset="0"/>
+                <a:cs typeface="Arial" panose="020B0604020202020204" pitchFamily="34" charset="0"/>
+              </a:rPr>
+              <a:t>Backend (API Endpoint) </a:t>
+            </a:r>
+            <a:r>
+              <a:rPr lang="en-US" dirty="0" err="1">
+                <a:latin typeface="Arial" panose="020B0604020202020204" pitchFamily="34" charset="0"/>
+                <a:cs typeface="Arial" panose="020B0604020202020204" pitchFamily="34" charset="0"/>
+              </a:rPr>
+              <a:t>fertig</a:t>
+            </a:r>
+            <a:endParaRPr lang="en-US" dirty="0">
+              <a:latin typeface="Arial" panose="020B0604020202020204" pitchFamily="34" charset="0"/>
+              <a:cs typeface="Arial" panose="020B0604020202020204" pitchFamily="34" charset="0"/>
+            </a:endParaRPr>
+          </a:p>
+          <a:p>
+            <a:pPr lvl="1"/>
+            <a:r>
+              <a:rPr lang="en-US" dirty="0">
+                <a:latin typeface="Arial" panose="020B0604020202020204" pitchFamily="34" charset="0"/>
+                <a:cs typeface="Arial" panose="020B0604020202020204" pitchFamily="34" charset="0"/>
+              </a:rPr>
+              <a:t>DB </a:t>
+            </a:r>
+            <a:r>
+              <a:rPr lang="en-US" dirty="0" err="1">
+                <a:latin typeface="Arial" panose="020B0604020202020204" pitchFamily="34" charset="0"/>
+                <a:cs typeface="Arial" panose="020B0604020202020204" pitchFamily="34" charset="0"/>
+              </a:rPr>
+              <a:t>Komplett</a:t>
+            </a:r>
+            <a:r>
+              <a:rPr lang="en-US" dirty="0">
+                <a:latin typeface="Arial" panose="020B0604020202020204" pitchFamily="34" charset="0"/>
+                <a:cs typeface="Arial" panose="020B0604020202020204" pitchFamily="34" charset="0"/>
+              </a:rPr>
+              <a:t> </a:t>
+            </a:r>
+            <a:r>
+              <a:rPr lang="en-US" dirty="0" err="1">
+                <a:latin typeface="Arial" panose="020B0604020202020204" pitchFamily="34" charset="0"/>
+                <a:cs typeface="Arial" panose="020B0604020202020204" pitchFamily="34" charset="0"/>
+              </a:rPr>
+              <a:t>implementiert</a:t>
+            </a:r>
+            <a:endParaRPr lang="en-US" dirty="0">
+              <a:latin typeface="Arial" panose="020B0604020202020204" pitchFamily="34" charset="0"/>
+              <a:cs typeface="Arial" panose="020B0604020202020204" pitchFamily="34" charset="0"/>
+            </a:endParaRPr>
+          </a:p>
+          <a:p>
+            <a:pPr lvl="1"/>
+            <a:r>
+              <a:rPr lang="en-US" dirty="0">
+                <a:latin typeface="Arial" panose="020B0604020202020204" pitchFamily="34" charset="0"/>
+                <a:cs typeface="Arial" panose="020B0604020202020204" pitchFamily="34" charset="0"/>
+              </a:rPr>
+              <a:t>Service </a:t>
+            </a:r>
+            <a:r>
+              <a:rPr lang="en-US" dirty="0" err="1">
+                <a:latin typeface="Arial" panose="020B0604020202020204" pitchFamily="34" charset="0"/>
+                <a:cs typeface="Arial" panose="020B0604020202020204" pitchFamily="34" charset="0"/>
+              </a:rPr>
+              <a:t>komplett</a:t>
+            </a:r>
+            <a:endParaRPr lang="en-US" dirty="0">
+              <a:latin typeface="Arial" panose="020B0604020202020204" pitchFamily="34" charset="0"/>
+              <a:cs typeface="Arial" panose="020B0604020202020204" pitchFamily="34" charset="0"/>
+            </a:endParaRPr>
+          </a:p>
+          <a:p>
+            <a:r>
+              <a:rPr lang="en-US" dirty="0" err="1">
+                <a:latin typeface="Arial" panose="020B0604020202020204" pitchFamily="34" charset="0"/>
+                <a:cs typeface="Arial" panose="020B0604020202020204" pitchFamily="34" charset="0"/>
+              </a:rPr>
+              <a:t>Negativ</a:t>
+            </a:r>
+            <a:r>
+              <a:rPr lang="en-US" dirty="0">
+                <a:latin typeface="Arial" panose="020B0604020202020204" pitchFamily="34" charset="0"/>
+                <a:cs typeface="Arial" panose="020B0604020202020204" pitchFamily="34" charset="0"/>
+              </a:rPr>
+              <a:t>:</a:t>
+            </a:r>
+          </a:p>
+          <a:p>
+            <a:pPr lvl="1"/>
+            <a:r>
+              <a:rPr lang="en-US" dirty="0" err="1">
+                <a:latin typeface="Arial" panose="020B0604020202020204" pitchFamily="34" charset="0"/>
+                <a:cs typeface="Arial" panose="020B0604020202020204" pitchFamily="34" charset="0"/>
+              </a:rPr>
+              <a:t>Nicht</a:t>
+            </a:r>
+            <a:r>
+              <a:rPr lang="en-US" dirty="0">
+                <a:latin typeface="Arial" panose="020B0604020202020204" pitchFamily="34" charset="0"/>
+                <a:cs typeface="Arial" panose="020B0604020202020204" pitchFamily="34" charset="0"/>
+              </a:rPr>
+              <a:t> alle Components </a:t>
+            </a:r>
+            <a:r>
+              <a:rPr lang="en-US" dirty="0" err="1">
+                <a:latin typeface="Arial" panose="020B0604020202020204" pitchFamily="34" charset="0"/>
+                <a:cs typeface="Arial" panose="020B0604020202020204" pitchFamily="34" charset="0"/>
+              </a:rPr>
+              <a:t>implementiert</a:t>
+            </a:r>
+            <a:endParaRPr lang="en-US" dirty="0">
+              <a:latin typeface="Arial" panose="020B0604020202020204" pitchFamily="34" charset="0"/>
+              <a:cs typeface="Arial" panose="020B0604020202020204" pitchFamily="34" charset="0"/>
+            </a:endParaRPr>
+          </a:p>
+          <a:p>
+            <a:pPr lvl="1"/>
+            <a:r>
+              <a:rPr lang="en-US" dirty="0" err="1">
+                <a:latin typeface="Arial" panose="020B0604020202020204" pitchFamily="34" charset="0"/>
+                <a:cs typeface="Arial" panose="020B0604020202020204" pitchFamily="34" charset="0"/>
+              </a:rPr>
+              <a:t>Gekürzte</a:t>
+            </a:r>
+            <a:r>
+              <a:rPr lang="en-US" dirty="0">
+                <a:latin typeface="Arial" panose="020B0604020202020204" pitchFamily="34" charset="0"/>
+                <a:cs typeface="Arial" panose="020B0604020202020204" pitchFamily="34" charset="0"/>
+              </a:rPr>
+              <a:t> </a:t>
+            </a:r>
+            <a:r>
+              <a:rPr lang="en-US" dirty="0" err="1">
+                <a:latin typeface="Arial" panose="020B0604020202020204" pitchFamily="34" charset="0"/>
+                <a:cs typeface="Arial" panose="020B0604020202020204" pitchFamily="34" charset="0"/>
+              </a:rPr>
+              <a:t>Dokumentation</a:t>
+            </a:r>
+            <a:endParaRPr lang="en-US" dirty="0">
+              <a:latin typeface="Arial" panose="020B0604020202020204" pitchFamily="34" charset="0"/>
+              <a:cs typeface="Arial" panose="020B0604020202020204" pitchFamily="34" charset="0"/>
+            </a:endParaRPr>
+          </a:p>
+        </p:txBody>
+      </p:sp>
+    </p:spTree>
+    <p:extLst>
+      <p:ext uri="{BB962C8B-B14F-4D97-AF65-F5344CB8AC3E}">
+        <p14:creationId xmlns:p14="http://schemas.microsoft.com/office/powerpoint/2010/main" val="174809976"/>
+      </p:ext>
+    </p:extLst>
+  </p:cSld>
+  <p:clrMapOvr>
+    <a:masterClrMapping/>
+  </p:clrMapOvr>
+</p:sld>
+</file>
+
+<file path=ppt/slides/slide15.xml><?xml version="1.0" encoding="utf-8"?>
+<p:sld xmlns:a="http://schemas.openxmlformats.org/drawingml/2006/main" xmlns:r="http://schemas.openxmlformats.org/officeDocument/2006/relationships" xmlns:p="http://schemas.openxmlformats.org/presentationml/2006/main">
+  <p:cSld>
+    <p:spTree>
+      <p:nvGrpSpPr>
+        <p:cNvPr id="1" name=""/>
+        <p:cNvGrpSpPr/>
+        <p:nvPr/>
+      </p:nvGrpSpPr>
+      <p:grpSpPr>
+        <a:xfrm>
+          <a:off x="0" y="0"/>
+          <a:ext cx="0" cy="0"/>
+          <a:chOff x="0" y="0"/>
+          <a:chExt cx="0" cy="0"/>
+        </a:xfrm>
+      </p:grpSpPr>
+      <p:sp>
+        <p:nvSpPr>
+          <p:cNvPr id="2" name="Title 1">
+            <a:extLst>
+              <a:ext uri="{FF2B5EF4-FFF2-40B4-BE49-F238E27FC236}">
+                <a16:creationId xmlns:a16="http://schemas.microsoft.com/office/drawing/2014/main" id="{37F01264-788C-3214-76B3-BAB028A4C631}"/>
+              </a:ext>
+            </a:extLst>
+          </p:cNvPr>
+          <p:cNvSpPr>
+            <a:spLocks noGrp="1"/>
+          </p:cNvSpPr>
+          <p:nvPr>
+            <p:ph type="title"/>
+          </p:nvPr>
+        </p:nvSpPr>
+        <p:spPr/>
+        <p:txBody>
+          <a:bodyPr/>
+          <a:lstStyle/>
+          <a:p>
+            <a:r>
+              <a:rPr lang="en-US" dirty="0" err="1"/>
+              <a:t>Verbesserungen</a:t>
+            </a:r>
+            <a:endParaRPr lang="en-CH" dirty="0"/>
+          </a:p>
+        </p:txBody>
+      </p:sp>
+      <p:sp>
+        <p:nvSpPr>
+          <p:cNvPr id="3" name="Content Placeholder 2">
+            <a:extLst>
+              <a:ext uri="{FF2B5EF4-FFF2-40B4-BE49-F238E27FC236}">
+                <a16:creationId xmlns:a16="http://schemas.microsoft.com/office/drawing/2014/main" id="{9C027187-8EED-63DB-1F28-8D3F1DE1337D}"/>
+              </a:ext>
+            </a:extLst>
+          </p:cNvPr>
+          <p:cNvSpPr>
+            <a:spLocks noGrp="1"/>
+          </p:cNvSpPr>
+          <p:nvPr>
+            <p:ph idx="1"/>
+          </p:nvPr>
+        </p:nvSpPr>
+        <p:spPr/>
+        <p:txBody>
+          <a:bodyPr/>
+          <a:lstStyle/>
+          <a:p>
+            <a:r>
+              <a:rPr lang="en-US" dirty="0"/>
+              <a:t>Mehr Zeit für Doku </a:t>
+            </a:r>
+            <a:r>
+              <a:rPr lang="en-US" dirty="0" err="1"/>
+              <a:t>aufwenden</a:t>
+            </a:r>
+            <a:endParaRPr lang="en-US" dirty="0"/>
+          </a:p>
+          <a:p>
+            <a:r>
+              <a:rPr lang="en-US" dirty="0" err="1"/>
+              <a:t>Testkonzept</a:t>
+            </a:r>
+            <a:r>
+              <a:rPr lang="en-US" dirty="0"/>
+              <a:t> am </a:t>
+            </a:r>
+            <a:r>
+              <a:rPr lang="en-US" dirty="0" err="1"/>
+              <a:t>Anfang</a:t>
+            </a:r>
+            <a:r>
+              <a:rPr lang="en-US" dirty="0"/>
+              <a:t> </a:t>
+            </a:r>
+            <a:r>
+              <a:rPr lang="en-US" dirty="0" err="1"/>
+              <a:t>machen</a:t>
+            </a:r>
+            <a:endParaRPr lang="en-US" dirty="0"/>
+          </a:p>
+          <a:p>
+            <a:r>
+              <a:rPr lang="en-US" dirty="0"/>
+              <a:t>Mehr </a:t>
+            </a:r>
+            <a:r>
+              <a:rPr lang="en-US" dirty="0" err="1"/>
+              <a:t>Vorbereitungsarbeiten</a:t>
+            </a:r>
+            <a:r>
+              <a:rPr lang="en-US" dirty="0"/>
+              <a:t> </a:t>
+            </a:r>
+            <a:r>
+              <a:rPr lang="en-US" dirty="0" err="1"/>
+              <a:t>ausführen</a:t>
+            </a:r>
+            <a:endParaRPr lang="en-US" dirty="0"/>
+          </a:p>
+          <a:p>
+            <a:r>
+              <a:rPr lang="en-US" dirty="0" err="1"/>
+              <a:t>Genügend</a:t>
+            </a:r>
+            <a:r>
+              <a:rPr lang="en-US" dirty="0"/>
+              <a:t> </a:t>
+            </a:r>
+            <a:r>
+              <a:rPr lang="en-US" dirty="0" err="1"/>
+              <a:t>früh</a:t>
+            </a:r>
+            <a:r>
+              <a:rPr lang="en-US" dirty="0"/>
+              <a:t> </a:t>
+            </a:r>
+            <a:r>
+              <a:rPr lang="en-US" dirty="0" err="1"/>
+              <a:t>mit</a:t>
+            </a:r>
+            <a:r>
+              <a:rPr lang="en-US" dirty="0"/>
+              <a:t> </a:t>
+            </a:r>
+            <a:r>
+              <a:rPr lang="en-US" dirty="0" err="1"/>
+              <a:t>Abgabe</a:t>
+            </a:r>
+            <a:r>
+              <a:rPr lang="en-US" dirty="0"/>
+              <a:t> </a:t>
+            </a:r>
+            <a:r>
+              <a:rPr lang="en-US" dirty="0" err="1"/>
+              <a:t>anfangen</a:t>
+            </a:r>
+            <a:endParaRPr lang="en-US" dirty="0"/>
+          </a:p>
+          <a:p>
+            <a:r>
+              <a:rPr lang="en-US" dirty="0" err="1"/>
+              <a:t>Kleinere</a:t>
+            </a:r>
+            <a:r>
+              <a:rPr lang="en-US" dirty="0"/>
+              <a:t> </a:t>
+            </a:r>
+            <a:r>
+              <a:rPr lang="en-US" dirty="0" err="1"/>
+              <a:t>Fehlentscheidungen</a:t>
+            </a:r>
+            <a:r>
+              <a:rPr lang="en-US" dirty="0"/>
+              <a:t> </a:t>
+            </a:r>
+            <a:r>
+              <a:rPr lang="en-US" dirty="0" err="1"/>
+              <a:t>ausbügeln</a:t>
+            </a:r>
+            <a:endParaRPr lang="en-US" dirty="0"/>
+          </a:p>
+          <a:p>
+            <a:endParaRPr lang="en-US" dirty="0"/>
+          </a:p>
+        </p:txBody>
+      </p:sp>
+    </p:spTree>
+    <p:extLst>
+      <p:ext uri="{BB962C8B-B14F-4D97-AF65-F5344CB8AC3E}">
+        <p14:creationId xmlns:p14="http://schemas.microsoft.com/office/powerpoint/2010/main" val="334265623"/>
+      </p:ext>
+    </p:extLst>
+  </p:cSld>
+  <p:clrMapOvr>
+    <a:masterClrMapping/>
+  </p:clrMapOvr>
+</p:sld>
+</file>
+
+<file path=ppt/slides/slide16.xml><?xml version="1.0" encoding="utf-8"?>
 <p:sld xmlns:a="http://schemas.openxmlformats.org/drawingml/2006/main" xmlns:r="http://schemas.openxmlformats.org/officeDocument/2006/relationships" xmlns:p="http://schemas.openxmlformats.org/presentationml/2006/main">
   <p:cSld>
     <p:spTree>
@@ -7518,6 +9457,12 @@
               <a:t>HTTP</a:t>
             </a:r>
           </a:p>
+          <a:p>
+            <a:r>
+              <a:rPr lang="en-US" dirty="0"/>
+              <a:t>Interceptor</a:t>
+            </a:r>
+          </a:p>
         </p:txBody>
       </p:sp>
     </p:spTree>
@@ -7600,10 +9545,122 @@
           <a:bodyPr/>
           <a:lstStyle/>
           <a:p>
-            <a:endParaRPr lang="en-CH"/>
-          </a:p>
-        </p:txBody>
-      </p:sp>
+            <a:r>
+              <a:rPr lang="en-US" dirty="0"/>
+              <a:t>HTML</a:t>
+            </a:r>
+          </a:p>
+          <a:p>
+            <a:r>
+              <a:rPr lang="en-US" dirty="0"/>
+              <a:t>SCSS</a:t>
+            </a:r>
+          </a:p>
+          <a:p>
+            <a:pPr lvl="1"/>
+            <a:r>
+              <a:rPr lang="en-US" dirty="0"/>
+              <a:t>Styling</a:t>
+            </a:r>
+          </a:p>
+          <a:p>
+            <a:r>
+              <a:rPr lang="en-US" dirty="0"/>
+              <a:t>TS</a:t>
+            </a:r>
+          </a:p>
+        </p:txBody>
+      </p:sp>
+      <p:pic>
+        <p:nvPicPr>
+          <p:cNvPr id="5" name="Picture 4">
+            <a:extLst>
+              <a:ext uri="{FF2B5EF4-FFF2-40B4-BE49-F238E27FC236}">
+                <a16:creationId xmlns:a16="http://schemas.microsoft.com/office/drawing/2014/main" id="{77AFA682-4D10-AB5B-9811-1038DE7F5246}"/>
+              </a:ext>
+            </a:extLst>
+          </p:cNvPr>
+          <p:cNvPicPr>
+            <a:picLocks noChangeAspect="1"/>
+          </p:cNvPicPr>
+          <p:nvPr/>
+        </p:nvPicPr>
+        <p:blipFill>
+          <a:blip r:embed="rId2"/>
+          <a:stretch>
+            <a:fillRect/>
+          </a:stretch>
+        </p:blipFill>
+        <p:spPr>
+          <a:xfrm>
+            <a:off x="7205708" y="0"/>
+            <a:ext cx="4986292" cy="3818586"/>
+          </a:xfrm>
+          <a:prstGeom prst="rect">
+            <a:avLst/>
+          </a:prstGeom>
+        </p:spPr>
+      </p:pic>
+      <p:pic>
+        <p:nvPicPr>
+          <p:cNvPr id="7" name="Picture 6">
+            <a:extLst>
+              <a:ext uri="{FF2B5EF4-FFF2-40B4-BE49-F238E27FC236}">
+                <a16:creationId xmlns:a16="http://schemas.microsoft.com/office/drawing/2014/main" id="{08DD9D10-0294-B180-075F-9B68B2E189BF}"/>
+              </a:ext>
+            </a:extLst>
+          </p:cNvPr>
+          <p:cNvPicPr>
+            <a:picLocks noChangeAspect="1"/>
+          </p:cNvPicPr>
+          <p:nvPr/>
+        </p:nvPicPr>
+        <p:blipFill>
+          <a:blip r:embed="rId3"/>
+          <a:stretch>
+            <a:fillRect/>
+          </a:stretch>
+        </p:blipFill>
+        <p:spPr>
+          <a:xfrm>
+            <a:off x="3199774" y="2806908"/>
+            <a:ext cx="2152950" cy="990738"/>
+          </a:xfrm>
+          <a:prstGeom prst="rect">
+            <a:avLst/>
+          </a:prstGeom>
+        </p:spPr>
+      </p:pic>
+      <p:pic>
+        <p:nvPicPr>
+          <p:cNvPr id="9" name="Picture 8">
+            <a:extLst>
+              <a:ext uri="{FF2B5EF4-FFF2-40B4-BE49-F238E27FC236}">
+                <a16:creationId xmlns:a16="http://schemas.microsoft.com/office/drawing/2014/main" id="{3F5F364D-FAB4-9832-BC79-E1D51BD58C25}"/>
+              </a:ext>
+            </a:extLst>
+          </p:cNvPr>
+          <p:cNvPicPr>
+            <a:picLocks noChangeAspect="1"/>
+          </p:cNvPicPr>
+          <p:nvPr/>
+        </p:nvPicPr>
+        <p:blipFill>
+          <a:blip r:embed="rId4"/>
+          <a:stretch>
+            <a:fillRect/>
+          </a:stretch>
+        </p:blipFill>
+        <p:spPr>
+          <a:xfrm>
+            <a:off x="398760" y="3818586"/>
+            <a:ext cx="4953964" cy="2927342"/>
+          </a:xfrm>
+          <a:prstGeom prst="rect">
+            <a:avLst/>
+          </a:prstGeom>
+        </p:spPr>
+      </p:pic>
     </p:spTree>
     <p:extLst>
       <p:ext uri="{BB962C8B-B14F-4D97-AF65-F5344CB8AC3E}">

</xml_diff>